<commit_message>
La Palabra de Dios
</commit_message>
<xml_diff>
--- a/slideshow/Teologia Sistematica y Biblica - Myer Pearlman/1. Introduccion.pptx
+++ b/slideshow/Teologia Sistematica y Biblica - Myer Pearlman/1. Introduccion.pptx
@@ -129,10 +129,21 @@
   </p:defaultTextStyle>
   <p:extLst>
     <p:ext uri="{EFAFB233-063F-42B5-8137-9DF3F51BA10A}">
-      <p15:sldGuideLst xmlns:p15="http://schemas.microsoft.com/office/powerpoint/2012/main" xmlns=""/>
+      <p15:sldGuideLst xmlns:p15="http://schemas.microsoft.com/office/powerpoint/2012/main">
+        <p15:guide id="1" orient="horz" pos="1800">
+          <p15:clr>
+            <a:srgbClr val="A4A3A4"/>
+          </p15:clr>
+        </p15:guide>
+        <p15:guide id="2" pos="2880">
+          <p15:clr>
+            <a:srgbClr val="A4A3A4"/>
+          </p15:clr>
+        </p15:guide>
+      </p15:sldGuideLst>
     </p:ext>
     <p:ext uri="{2D200454-40CA-4A62-9FC3-DE9A4176ACB9}">
-      <p15:notesGuideLst xmlns:p15="http://schemas.microsoft.com/office/powerpoint/2012/main" xmlns=""/>
+      <p15:notesGuideLst xmlns:p15="http://schemas.microsoft.com/office/powerpoint/2012/main"/>
     </p:ext>
   </p:extLst>
 </p:presentation>
@@ -222,7 +233,7 @@
             <a:pPr rtl="0"/>
             <a:fld id="{16311DD2-1404-4AD4-9614-501E06A89033}" type="datetime1">
               <a:rPr lang="es-ES" smtClean="0"/>
-              <a:t>05/01/2021</a:t>
+              <a:t>17/02/2021</a:t>
             </a:fld>
             <a:endParaRPr lang="es-ES" dirty="0"/>
           </a:p>
@@ -391,7 +402,7 @@
             <a:fld id="{83E2FCFB-5C3A-4B64-B75C-00008EE5FFC6}" type="datetime1">
               <a:rPr lang="es-ES" smtClean="0"/>
               <a:pPr/>
-              <a:t>05/01/2021</a:t>
+              <a:t>17/02/2021</a:t>
             </a:fld>
             <a:endParaRPr lang="es-ES" dirty="0"/>
           </a:p>
@@ -2736,7 +2747,7 @@
             <a:pPr rtl="0"/>
             <a:fld id="{26C8FCF1-F3AA-4FDB-8A17-2C171E308741}" type="datetime1">
               <a:rPr lang="es-ES" noProof="0" smtClean="0"/>
-              <a:t>05/01/2021</a:t>
+              <a:t>17/02/2021</a:t>
             </a:fld>
             <a:endParaRPr lang="es-ES" noProof="0" dirty="0"/>
           </a:p>
@@ -2963,7 +2974,7 @@
             <a:pPr rtl="0"/>
             <a:fld id="{C5470B91-F814-4B9B-AA3B-3C51F2BE89C5}" type="datetime1">
               <a:rPr lang="es-ES" noProof="0" smtClean="0"/>
-              <a:t>05/01/2021</a:t>
+              <a:t>17/02/2021</a:t>
             </a:fld>
             <a:endParaRPr lang="es-ES" noProof="0" dirty="0"/>
           </a:p>
@@ -3147,7 +3158,7 @@
             <a:pPr rtl="0"/>
             <a:fld id="{ED835F3C-9C57-4EBD-805B-107A2B7AB542}" type="datetime1">
               <a:rPr lang="es-ES" noProof="0" smtClean="0"/>
-              <a:t>05/01/2021</a:t>
+              <a:t>17/02/2021</a:t>
             </a:fld>
             <a:endParaRPr lang="es-ES" noProof="0" dirty="0"/>
           </a:p>
@@ -3321,7 +3332,7 @@
             <a:pPr rtl="0"/>
             <a:fld id="{AB699E20-7F7B-4F37-AFD2-50870051BB9C}" type="datetime1">
               <a:rPr lang="es-ES" noProof="0" smtClean="0"/>
-              <a:t>05/01/2021</a:t>
+              <a:t>17/02/2021</a:t>
             </a:fld>
             <a:endParaRPr lang="es-ES" noProof="0" dirty="0"/>
           </a:p>
@@ -3576,7 +3587,7 @@
             <a:pPr rtl="0"/>
             <a:fld id="{245D95F4-6294-46FB-BED2-470C54CD309B}" type="datetime1">
               <a:rPr lang="es-ES" noProof="0" smtClean="0"/>
-              <a:t>05/01/2021</a:t>
+              <a:t>17/02/2021</a:t>
             </a:fld>
             <a:endParaRPr lang="es-ES" noProof="0" dirty="0"/>
           </a:p>
@@ -3903,7 +3914,7 @@
             <a:pPr rtl="0"/>
             <a:fld id="{B212402B-58A7-4079-84A4-9B3ECD262263}" type="datetime1">
               <a:rPr lang="es-ES" noProof="0" smtClean="0"/>
-              <a:t>05/01/2021</a:t>
+              <a:t>17/02/2021</a:t>
             </a:fld>
             <a:endParaRPr lang="es-ES" noProof="0" dirty="0"/>
           </a:p>
@@ -4331,7 +4342,7 @@
             <a:pPr rtl="0"/>
             <a:fld id="{6E4FA3BB-22B0-47F1-9051-72CDE62E688F}" type="datetime1">
               <a:rPr lang="es-ES" noProof="0" smtClean="0"/>
-              <a:t>05/01/2021</a:t>
+              <a:t>17/02/2021</a:t>
             </a:fld>
             <a:endParaRPr lang="es-ES" noProof="0" dirty="0"/>
           </a:p>
@@ -4453,7 +4464,7 @@
             <a:pPr rtl="0"/>
             <a:fld id="{B723C4E6-6BAB-45D7-A331-7972B0412103}" type="datetime1">
               <a:rPr lang="es-ES" noProof="0" smtClean="0"/>
-              <a:t>05/01/2021</a:t>
+              <a:t>17/02/2021</a:t>
             </a:fld>
             <a:endParaRPr lang="es-ES" noProof="0" dirty="0"/>
           </a:p>
@@ -4551,7 +4562,7 @@
             <a:pPr rtl="0"/>
             <a:fld id="{F66E4CD3-F2CC-42DA-BE22-23AE45D6EF47}" type="datetime1">
               <a:rPr lang="es-ES" noProof="0" smtClean="0"/>
-              <a:t>05/01/2021</a:t>
+              <a:t>17/02/2021</a:t>
             </a:fld>
             <a:endParaRPr lang="es-ES" noProof="0" dirty="0"/>
           </a:p>
@@ -4845,7 +4856,7 @@
             <a:pPr rtl="0"/>
             <a:fld id="{0E590D0D-54FD-4BE8-9D95-21C52216E548}" type="datetime1">
               <a:rPr lang="es-ES" noProof="0" smtClean="0"/>
-              <a:t>05/01/2021</a:t>
+              <a:t>17/02/2021</a:t>
             </a:fld>
             <a:endParaRPr lang="es-ES" noProof="0" dirty="0"/>
           </a:p>
@@ -5122,7 +5133,7 @@
             <a:pPr rtl="0"/>
             <a:fld id="{7E067088-AA6F-4E5A-ABD3-B4AB2417079E}" type="datetime1">
               <a:rPr lang="es-ES" noProof="0" smtClean="0"/>
-              <a:t>05/01/2021</a:t>
+              <a:t>17/02/2021</a:t>
             </a:fld>
             <a:endParaRPr lang="es-ES" noProof="0" dirty="0"/>
           </a:p>
@@ -5378,7 +5389,7 @@
             <a:pPr rtl="0"/>
             <a:fld id="{FA6F2DB0-AA7B-40EF-A1F6-597D5286B151}" type="datetime1">
               <a:rPr lang="es-ES" noProof="0" smtClean="0"/>
-              <a:t>05/01/2021</a:t>
+              <a:t>17/02/2021</a:t>
             </a:fld>
             <a:endParaRPr lang="es-ES" noProof="0" dirty="0"/>
           </a:p>
@@ -5848,7 +5859,7 @@
           <p:cNvPr id="2" name="Título 1">
             <a:extLst>
               <a:ext uri="{FF2B5EF4-FFF2-40B4-BE49-F238E27FC236}">
-                <a16:creationId xmlns:a16="http://schemas.microsoft.com/office/drawing/2014/main" xmlns="" id="{B181F489-B701-4C74-9747-27C8656A89CC}"/>
+                <a16:creationId xmlns:a16="http://schemas.microsoft.com/office/drawing/2014/main" id="{B181F489-B701-4C74-9747-27C8656A89CC}"/>
               </a:ext>
             </a:extLst>
           </p:cNvPr>
@@ -5902,7 +5913,7 @@
           <p:cNvPr id="3" name="Subtítulo 2">
             <a:extLst>
               <a:ext uri="{FF2B5EF4-FFF2-40B4-BE49-F238E27FC236}">
-                <a16:creationId xmlns:a16="http://schemas.microsoft.com/office/drawing/2014/main" xmlns="" id="{6D699F35-1401-4ECD-9F96-7017DB9FA104}"/>
+                <a16:creationId xmlns:a16="http://schemas.microsoft.com/office/drawing/2014/main" id="{6D699F35-1401-4ECD-9F96-7017DB9FA104}"/>
               </a:ext>
             </a:extLst>
           </p:cNvPr>
@@ -5949,13 +5960,6 @@
   <p:clrMapOvr>
     <a:masterClrMapping/>
   </p:clrMapOvr>
-  <p:timing>
-    <p:tnLst>
-      <p:par>
-        <p:cTn id="1" dur="indefinite" restart="never" nodeType="tmRoot"/>
-      </p:par>
-    </p:tnLst>
-  </p:timing>
 </p:sld>
 </file>
 
@@ -5981,7 +5985,7 @@
           <p:cNvPr id="2" name="Título 1">
             <a:extLst>
               <a:ext uri="{FF2B5EF4-FFF2-40B4-BE49-F238E27FC236}">
-                <a16:creationId xmlns:a16="http://schemas.microsoft.com/office/drawing/2014/main" xmlns="" id="{F2153DD3-C27C-457D-ADDD-066D01CB95CA}"/>
+                <a16:creationId xmlns:a16="http://schemas.microsoft.com/office/drawing/2014/main" id="{F2153DD3-C27C-457D-ADDD-066D01CB95CA}"/>
               </a:ext>
             </a:extLst>
           </p:cNvPr>
@@ -6021,7 +6025,7 @@
           <p:cNvPr id="4" name="Marcador de contenido 3">
             <a:extLst>
               <a:ext uri="{FF2B5EF4-FFF2-40B4-BE49-F238E27FC236}">
-                <a16:creationId xmlns:a16="http://schemas.microsoft.com/office/drawing/2014/main" xmlns="" id="{31F44B22-324B-4DE8-B32C-85312184904C}"/>
+                <a16:creationId xmlns:a16="http://schemas.microsoft.com/office/drawing/2014/main" id="{31F44B22-324B-4DE8-B32C-85312184904C}"/>
               </a:ext>
             </a:extLst>
           </p:cNvPr>
@@ -6051,7 +6055,7 @@
                 <a:gridCol w="8345244">
                   <a:extLst>
                     <a:ext uri="{9D8B030D-6E8A-4147-A177-3AD203B41FA5}">
-                      <a16:colId xmlns:a16="http://schemas.microsoft.com/office/drawing/2014/main" xmlns="" val="743422230"/>
+                      <a16:colId xmlns:a16="http://schemas.microsoft.com/office/drawing/2014/main" val="743422230"/>
                     </a:ext>
                   </a:extLst>
                 </a:gridCol>
@@ -6268,7 +6272,7 @@
                 </a:tc>
                 <a:extLst>
                   <a:ext uri="{0D108BD9-81ED-4DB2-BD59-A6C34878D82A}">
-                    <a16:rowId xmlns:a16="http://schemas.microsoft.com/office/drawing/2014/main" xmlns="" val="744739329"/>
+                    <a16:rowId xmlns:a16="http://schemas.microsoft.com/office/drawing/2014/main" val="744739329"/>
                   </a:ext>
                 </a:extLst>
               </a:tr>
@@ -6281,7 +6285,7 @@
           <p:cNvPr id="5" name="Gráfico 4" descr="Lápiz">
             <a:extLst>
               <a:ext uri="{FF2B5EF4-FFF2-40B4-BE49-F238E27FC236}">
-                <a16:creationId xmlns:a16="http://schemas.microsoft.com/office/drawing/2014/main" xmlns="" id="{0A74E1BB-B1CA-413B-8313-F68AA049A917}"/>
+                <a16:creationId xmlns:a16="http://schemas.microsoft.com/office/drawing/2014/main" id="{0A74E1BB-B1CA-413B-8313-F68AA049A917}"/>
               </a:ext>
             </a:extLst>
           </p:cNvPr>
@@ -6294,7 +6298,7 @@
           <a:blip r:embed="rId3">
             <a:extLst>
               <a:ext uri="{96DAC541-7B7A-43D3-8B79-37D633B846F1}">
-                <asvg:svgBlip xmlns:asvg="http://schemas.microsoft.com/office/drawing/2016/SVG/main" xmlns="" r:embed="rId4"/>
+                <asvg:svgBlip xmlns:asvg="http://schemas.microsoft.com/office/drawing/2016/SVG/main" r:embed="rId4"/>
               </a:ext>
             </a:extLst>
           </a:blip>
@@ -6322,13 +6326,6 @@
   <p:clrMapOvr>
     <a:masterClrMapping/>
   </p:clrMapOvr>
-  <p:timing>
-    <p:tnLst>
-      <p:par>
-        <p:cTn id="1" dur="indefinite" restart="never" nodeType="tmRoot"/>
-      </p:par>
-    </p:tnLst>
-  </p:timing>
 </p:sld>
 </file>
 
@@ -6354,7 +6351,7 @@
           <p:cNvPr id="2" name="Título 1">
             <a:extLst>
               <a:ext uri="{FF2B5EF4-FFF2-40B4-BE49-F238E27FC236}">
-                <a16:creationId xmlns:a16="http://schemas.microsoft.com/office/drawing/2014/main" xmlns="" id="{F2153DD3-C27C-457D-ADDD-066D01CB95CA}"/>
+                <a16:creationId xmlns:a16="http://schemas.microsoft.com/office/drawing/2014/main" id="{F2153DD3-C27C-457D-ADDD-066D01CB95CA}"/>
               </a:ext>
             </a:extLst>
           </p:cNvPr>
@@ -6405,7 +6402,7 @@
           <p:cNvPr id="4" name="Marcador de contenido 3">
             <a:extLst>
               <a:ext uri="{FF2B5EF4-FFF2-40B4-BE49-F238E27FC236}">
-                <a16:creationId xmlns:a16="http://schemas.microsoft.com/office/drawing/2014/main" xmlns="" id="{31F44B22-324B-4DE8-B32C-85312184904C}"/>
+                <a16:creationId xmlns:a16="http://schemas.microsoft.com/office/drawing/2014/main" id="{31F44B22-324B-4DE8-B32C-85312184904C}"/>
               </a:ext>
             </a:extLst>
           </p:cNvPr>
@@ -6435,7 +6432,7 @@
                 <a:gridCol w="8345244">
                   <a:extLst>
                     <a:ext uri="{9D8B030D-6E8A-4147-A177-3AD203B41FA5}">
-                      <a16:colId xmlns:a16="http://schemas.microsoft.com/office/drawing/2014/main" xmlns="" val="743422230"/>
+                      <a16:colId xmlns:a16="http://schemas.microsoft.com/office/drawing/2014/main" val="743422230"/>
                     </a:ext>
                   </a:extLst>
                 </a:gridCol>
@@ -6597,7 +6594,7 @@
                 </a:tc>
                 <a:extLst>
                   <a:ext uri="{0D108BD9-81ED-4DB2-BD59-A6C34878D82A}">
-                    <a16:rowId xmlns:a16="http://schemas.microsoft.com/office/drawing/2014/main" xmlns="" val="744739329"/>
+                    <a16:rowId xmlns:a16="http://schemas.microsoft.com/office/drawing/2014/main" val="744739329"/>
                   </a:ext>
                 </a:extLst>
               </a:tr>
@@ -6610,7 +6607,7 @@
           <p:cNvPr id="5" name="Gráfico 4" descr="Lápiz">
             <a:extLst>
               <a:ext uri="{FF2B5EF4-FFF2-40B4-BE49-F238E27FC236}">
-                <a16:creationId xmlns:a16="http://schemas.microsoft.com/office/drawing/2014/main" xmlns="" id="{0A74E1BB-B1CA-413B-8313-F68AA049A917}"/>
+                <a16:creationId xmlns:a16="http://schemas.microsoft.com/office/drawing/2014/main" id="{0A74E1BB-B1CA-413B-8313-F68AA049A917}"/>
               </a:ext>
             </a:extLst>
           </p:cNvPr>
@@ -6623,7 +6620,7 @@
           <a:blip r:embed="rId3">
             <a:extLst>
               <a:ext uri="{96DAC541-7B7A-43D3-8B79-37D633B846F1}">
-                <asvg:svgBlip xmlns:asvg="http://schemas.microsoft.com/office/drawing/2016/SVG/main" xmlns="" r:embed="rId4"/>
+                <asvg:svgBlip xmlns:asvg="http://schemas.microsoft.com/office/drawing/2016/SVG/main" r:embed="rId4"/>
               </a:ext>
             </a:extLst>
           </a:blip>
@@ -6651,13 +6648,6 @@
   <p:clrMapOvr>
     <a:masterClrMapping/>
   </p:clrMapOvr>
-  <p:timing>
-    <p:tnLst>
-      <p:par>
-        <p:cTn id="1" dur="indefinite" restart="never" nodeType="tmRoot"/>
-      </p:par>
-    </p:tnLst>
-  </p:timing>
 </p:sld>
 </file>
 
@@ -6683,7 +6673,7 @@
           <p:cNvPr id="2" name="Título 1">
             <a:extLst>
               <a:ext uri="{FF2B5EF4-FFF2-40B4-BE49-F238E27FC236}">
-                <a16:creationId xmlns:a16="http://schemas.microsoft.com/office/drawing/2014/main" xmlns="" id="{F2153DD3-C27C-457D-ADDD-066D01CB95CA}"/>
+                <a16:creationId xmlns:a16="http://schemas.microsoft.com/office/drawing/2014/main" id="{F2153DD3-C27C-457D-ADDD-066D01CB95CA}"/>
               </a:ext>
             </a:extLst>
           </p:cNvPr>
@@ -6734,7 +6724,7 @@
           <p:cNvPr id="4" name="Marcador de contenido 3">
             <a:extLst>
               <a:ext uri="{FF2B5EF4-FFF2-40B4-BE49-F238E27FC236}">
-                <a16:creationId xmlns:a16="http://schemas.microsoft.com/office/drawing/2014/main" xmlns="" id="{31F44B22-324B-4DE8-B32C-85312184904C}"/>
+                <a16:creationId xmlns:a16="http://schemas.microsoft.com/office/drawing/2014/main" id="{31F44B22-324B-4DE8-B32C-85312184904C}"/>
               </a:ext>
             </a:extLst>
           </p:cNvPr>
@@ -6764,7 +6754,7 @@
                 <a:gridCol w="8345244">
                   <a:extLst>
                     <a:ext uri="{9D8B030D-6E8A-4147-A177-3AD203B41FA5}">
-                      <a16:colId xmlns:a16="http://schemas.microsoft.com/office/drawing/2014/main" xmlns="" val="743422230"/>
+                      <a16:colId xmlns:a16="http://schemas.microsoft.com/office/drawing/2014/main" val="743422230"/>
                     </a:ext>
                   </a:extLst>
                 </a:gridCol>
@@ -6884,7 +6874,7 @@
                 </a:tc>
                 <a:extLst>
                   <a:ext uri="{0D108BD9-81ED-4DB2-BD59-A6C34878D82A}">
-                    <a16:rowId xmlns:a16="http://schemas.microsoft.com/office/drawing/2014/main" xmlns="" val="744739329"/>
+                    <a16:rowId xmlns:a16="http://schemas.microsoft.com/office/drawing/2014/main" val="744739329"/>
                   </a:ext>
                 </a:extLst>
               </a:tr>
@@ -6897,7 +6887,7 @@
           <p:cNvPr id="5" name="Gráfico 4" descr="Lápiz">
             <a:extLst>
               <a:ext uri="{FF2B5EF4-FFF2-40B4-BE49-F238E27FC236}">
-                <a16:creationId xmlns:a16="http://schemas.microsoft.com/office/drawing/2014/main" xmlns="" id="{0A74E1BB-B1CA-413B-8313-F68AA049A917}"/>
+                <a16:creationId xmlns:a16="http://schemas.microsoft.com/office/drawing/2014/main" id="{0A74E1BB-B1CA-413B-8313-F68AA049A917}"/>
               </a:ext>
             </a:extLst>
           </p:cNvPr>
@@ -6910,7 +6900,7 @@
           <a:blip r:embed="rId3">
             <a:extLst>
               <a:ext uri="{96DAC541-7B7A-43D3-8B79-37D633B846F1}">
-                <asvg:svgBlip xmlns:asvg="http://schemas.microsoft.com/office/drawing/2016/SVG/main" xmlns="" r:embed="rId4"/>
+                <asvg:svgBlip xmlns:asvg="http://schemas.microsoft.com/office/drawing/2016/SVG/main" r:embed="rId4"/>
               </a:ext>
             </a:extLst>
           </a:blip>
@@ -6938,13 +6928,6 @@
   <p:clrMapOvr>
     <a:masterClrMapping/>
   </p:clrMapOvr>
-  <p:timing>
-    <p:tnLst>
-      <p:par>
-        <p:cTn id="1" dur="indefinite" restart="never" nodeType="tmRoot"/>
-      </p:par>
-    </p:tnLst>
-  </p:timing>
 </p:sld>
 </file>
 
@@ -6970,7 +6953,7 @@
           <p:cNvPr id="2" name="Título 1">
             <a:extLst>
               <a:ext uri="{FF2B5EF4-FFF2-40B4-BE49-F238E27FC236}">
-                <a16:creationId xmlns:a16="http://schemas.microsoft.com/office/drawing/2014/main" xmlns="" id="{F2153DD3-C27C-457D-ADDD-066D01CB95CA}"/>
+                <a16:creationId xmlns:a16="http://schemas.microsoft.com/office/drawing/2014/main" id="{F2153DD3-C27C-457D-ADDD-066D01CB95CA}"/>
               </a:ext>
             </a:extLst>
           </p:cNvPr>
@@ -7021,7 +7004,7 @@
           <p:cNvPr id="4" name="Marcador de contenido 3">
             <a:extLst>
               <a:ext uri="{FF2B5EF4-FFF2-40B4-BE49-F238E27FC236}">
-                <a16:creationId xmlns:a16="http://schemas.microsoft.com/office/drawing/2014/main" xmlns="" id="{31F44B22-324B-4DE8-B32C-85312184904C}"/>
+                <a16:creationId xmlns:a16="http://schemas.microsoft.com/office/drawing/2014/main" id="{31F44B22-324B-4DE8-B32C-85312184904C}"/>
               </a:ext>
             </a:extLst>
           </p:cNvPr>
@@ -7051,7 +7034,7 @@
                 <a:gridCol w="8345244">
                   <a:extLst>
                     <a:ext uri="{9D8B030D-6E8A-4147-A177-3AD203B41FA5}">
-                      <a16:colId xmlns:a16="http://schemas.microsoft.com/office/drawing/2014/main" xmlns="" val="743422230"/>
+                      <a16:colId xmlns:a16="http://schemas.microsoft.com/office/drawing/2014/main" val="743422230"/>
                     </a:ext>
                   </a:extLst>
                 </a:gridCol>
@@ -7191,7 +7174,7 @@
                 </a:tc>
                 <a:extLst>
                   <a:ext uri="{0D108BD9-81ED-4DB2-BD59-A6C34878D82A}">
-                    <a16:rowId xmlns:a16="http://schemas.microsoft.com/office/drawing/2014/main" xmlns="" val="744739329"/>
+                    <a16:rowId xmlns:a16="http://schemas.microsoft.com/office/drawing/2014/main" val="744739329"/>
                   </a:ext>
                 </a:extLst>
               </a:tr>
@@ -7204,7 +7187,7 @@
           <p:cNvPr id="5" name="Gráfico 4" descr="Lápiz">
             <a:extLst>
               <a:ext uri="{FF2B5EF4-FFF2-40B4-BE49-F238E27FC236}">
-                <a16:creationId xmlns:a16="http://schemas.microsoft.com/office/drawing/2014/main" xmlns="" id="{0A74E1BB-B1CA-413B-8313-F68AA049A917}"/>
+                <a16:creationId xmlns:a16="http://schemas.microsoft.com/office/drawing/2014/main" id="{0A74E1BB-B1CA-413B-8313-F68AA049A917}"/>
               </a:ext>
             </a:extLst>
           </p:cNvPr>
@@ -7217,7 +7200,7 @@
           <a:blip r:embed="rId3">
             <a:extLst>
               <a:ext uri="{96DAC541-7B7A-43D3-8B79-37D633B846F1}">
-                <asvg:svgBlip xmlns:asvg="http://schemas.microsoft.com/office/drawing/2016/SVG/main" xmlns="" r:embed="rId4"/>
+                <asvg:svgBlip xmlns:asvg="http://schemas.microsoft.com/office/drawing/2016/SVG/main" r:embed="rId4"/>
               </a:ext>
             </a:extLst>
           </a:blip>
@@ -7245,13 +7228,6 @@
   <p:clrMapOvr>
     <a:masterClrMapping/>
   </p:clrMapOvr>
-  <p:timing>
-    <p:tnLst>
-      <p:par>
-        <p:cTn id="1" dur="indefinite" restart="never" nodeType="tmRoot"/>
-      </p:par>
-    </p:tnLst>
-  </p:timing>
 </p:sld>
 </file>
 
@@ -7277,7 +7253,7 @@
           <p:cNvPr id="2" name="Título 1">
             <a:extLst>
               <a:ext uri="{FF2B5EF4-FFF2-40B4-BE49-F238E27FC236}">
-                <a16:creationId xmlns:a16="http://schemas.microsoft.com/office/drawing/2014/main" xmlns="" id="{F2153DD3-C27C-457D-ADDD-066D01CB95CA}"/>
+                <a16:creationId xmlns:a16="http://schemas.microsoft.com/office/drawing/2014/main" id="{F2153DD3-C27C-457D-ADDD-066D01CB95CA}"/>
               </a:ext>
             </a:extLst>
           </p:cNvPr>
@@ -7328,7 +7304,7 @@
           <p:cNvPr id="4" name="Marcador de contenido 3">
             <a:extLst>
               <a:ext uri="{FF2B5EF4-FFF2-40B4-BE49-F238E27FC236}">
-                <a16:creationId xmlns:a16="http://schemas.microsoft.com/office/drawing/2014/main" xmlns="" id="{31F44B22-324B-4DE8-B32C-85312184904C}"/>
+                <a16:creationId xmlns:a16="http://schemas.microsoft.com/office/drawing/2014/main" id="{31F44B22-324B-4DE8-B32C-85312184904C}"/>
               </a:ext>
             </a:extLst>
           </p:cNvPr>
@@ -7358,7 +7334,7 @@
                 <a:gridCol w="8345244">
                   <a:extLst>
                     <a:ext uri="{9D8B030D-6E8A-4147-A177-3AD203B41FA5}">
-                      <a16:colId xmlns:a16="http://schemas.microsoft.com/office/drawing/2014/main" xmlns="" val="743422230"/>
+                      <a16:colId xmlns:a16="http://schemas.microsoft.com/office/drawing/2014/main" val="743422230"/>
                     </a:ext>
                   </a:extLst>
                 </a:gridCol>
@@ -7404,29 +7380,7 @@
                           <a:ea typeface="+mn-ea"/>
                           <a:cs typeface="+mn-cs"/>
                         </a:rPr>
-                        <a:t>, y describe la forma </a:t>
-                      </a:r>
-                      <a:r>
-                        <a:rPr lang="es-VE" sz="2800" b="0" i="0" u="none" strike="noStrike" kern="1200" baseline="0" dirty="0" smtClean="0">
-                          <a:solidFill>
-                            <a:schemeClr val="lt1"/>
-                          </a:solidFill>
-                          <a:latin typeface="+mn-lt"/>
-                          <a:ea typeface="+mn-ea"/>
-                          <a:cs typeface="+mn-cs"/>
-                        </a:rPr>
-                        <a:t>en la cual </a:t>
-                      </a:r>
-                      <a:r>
-                        <a:rPr lang="es-VE" sz="2800" b="0" i="0" u="none" strike="noStrike" kern="1200" baseline="0" dirty="0">
-                          <a:solidFill>
-                            <a:schemeClr val="lt1"/>
-                          </a:solidFill>
-                          <a:latin typeface="+mn-lt"/>
-                          <a:ea typeface="+mn-ea"/>
-                          <a:cs typeface="+mn-cs"/>
-                        </a:rPr>
-                        <a:t>cada uno de los escritores presenta las doctrinas importantes.</a:t>
+                        <a:t>, y describe la forma en la cual cada uno de los escritores presenta las doctrinas importantes.</a:t>
                       </a:r>
                     </a:p>
                     <a:p>
@@ -7509,7 +7463,7 @@
                 </a:tc>
                 <a:extLst>
                   <a:ext uri="{0D108BD9-81ED-4DB2-BD59-A6C34878D82A}">
-                    <a16:rowId xmlns:a16="http://schemas.microsoft.com/office/drawing/2014/main" xmlns="" val="744739329"/>
+                    <a16:rowId xmlns:a16="http://schemas.microsoft.com/office/drawing/2014/main" val="744739329"/>
                   </a:ext>
                 </a:extLst>
               </a:tr>
@@ -7522,7 +7476,7 @@
           <p:cNvPr id="5" name="Gráfico 4" descr="Lápiz">
             <a:extLst>
               <a:ext uri="{FF2B5EF4-FFF2-40B4-BE49-F238E27FC236}">
-                <a16:creationId xmlns:a16="http://schemas.microsoft.com/office/drawing/2014/main" xmlns="" id="{0A74E1BB-B1CA-413B-8313-F68AA049A917}"/>
+                <a16:creationId xmlns:a16="http://schemas.microsoft.com/office/drawing/2014/main" id="{0A74E1BB-B1CA-413B-8313-F68AA049A917}"/>
               </a:ext>
             </a:extLst>
           </p:cNvPr>
@@ -7535,7 +7489,7 @@
           <a:blip r:embed="rId3">
             <a:extLst>
               <a:ext uri="{96DAC541-7B7A-43D3-8B79-37D633B846F1}">
-                <asvg:svgBlip xmlns:asvg="http://schemas.microsoft.com/office/drawing/2016/SVG/main" xmlns="" r:embed="rId4"/>
+                <asvg:svgBlip xmlns:asvg="http://schemas.microsoft.com/office/drawing/2016/SVG/main" r:embed="rId4"/>
               </a:ext>
             </a:extLst>
           </a:blip>
@@ -7563,13 +7517,6 @@
   <p:clrMapOvr>
     <a:masterClrMapping/>
   </p:clrMapOvr>
-  <p:timing>
-    <p:tnLst>
-      <p:par>
-        <p:cTn id="1" dur="indefinite" restart="never" nodeType="tmRoot"/>
-      </p:par>
-    </p:tnLst>
-  </p:timing>
 </p:sld>
 </file>
 
@@ -7595,7 +7542,7 @@
           <p:cNvPr id="2" name="Título 1">
             <a:extLst>
               <a:ext uri="{FF2B5EF4-FFF2-40B4-BE49-F238E27FC236}">
-                <a16:creationId xmlns:a16="http://schemas.microsoft.com/office/drawing/2014/main" xmlns="" id="{F2153DD3-C27C-457D-ADDD-066D01CB95CA}"/>
+                <a16:creationId xmlns:a16="http://schemas.microsoft.com/office/drawing/2014/main" id="{F2153DD3-C27C-457D-ADDD-066D01CB95CA}"/>
               </a:ext>
             </a:extLst>
           </p:cNvPr>
@@ -7646,7 +7593,7 @@
           <p:cNvPr id="4" name="Marcador de contenido 3">
             <a:extLst>
               <a:ext uri="{FF2B5EF4-FFF2-40B4-BE49-F238E27FC236}">
-                <a16:creationId xmlns:a16="http://schemas.microsoft.com/office/drawing/2014/main" xmlns="" id="{31F44B22-324B-4DE8-B32C-85312184904C}"/>
+                <a16:creationId xmlns:a16="http://schemas.microsoft.com/office/drawing/2014/main" id="{31F44B22-324B-4DE8-B32C-85312184904C}"/>
               </a:ext>
             </a:extLst>
           </p:cNvPr>
@@ -7676,7 +7623,7 @@
                 <a:gridCol w="8345244">
                   <a:extLst>
                     <a:ext uri="{9D8B030D-6E8A-4147-A177-3AD203B41FA5}">
-                      <a16:colId xmlns:a16="http://schemas.microsoft.com/office/drawing/2014/main" xmlns="" val="743422230"/>
+                      <a16:colId xmlns:a16="http://schemas.microsoft.com/office/drawing/2014/main" val="743422230"/>
                     </a:ext>
                   </a:extLst>
                 </a:gridCol>
@@ -7780,7 +7727,7 @@
                 </a:tc>
                 <a:extLst>
                   <a:ext uri="{0D108BD9-81ED-4DB2-BD59-A6C34878D82A}">
-                    <a16:rowId xmlns:a16="http://schemas.microsoft.com/office/drawing/2014/main" xmlns="" val="744739329"/>
+                    <a16:rowId xmlns:a16="http://schemas.microsoft.com/office/drawing/2014/main" val="744739329"/>
                   </a:ext>
                 </a:extLst>
               </a:tr>
@@ -7793,7 +7740,7 @@
           <p:cNvPr id="5" name="Gráfico 4" descr="Lápiz">
             <a:extLst>
               <a:ext uri="{FF2B5EF4-FFF2-40B4-BE49-F238E27FC236}">
-                <a16:creationId xmlns:a16="http://schemas.microsoft.com/office/drawing/2014/main" xmlns="" id="{0A74E1BB-B1CA-413B-8313-F68AA049A917}"/>
+                <a16:creationId xmlns:a16="http://schemas.microsoft.com/office/drawing/2014/main" id="{0A74E1BB-B1CA-413B-8313-F68AA049A917}"/>
               </a:ext>
             </a:extLst>
           </p:cNvPr>
@@ -7806,7 +7753,7 @@
           <a:blip r:embed="rId3">
             <a:extLst>
               <a:ext uri="{96DAC541-7B7A-43D3-8B79-37D633B846F1}">
-                <asvg:svgBlip xmlns:asvg="http://schemas.microsoft.com/office/drawing/2016/SVG/main" xmlns="" r:embed="rId4"/>
+                <asvg:svgBlip xmlns:asvg="http://schemas.microsoft.com/office/drawing/2016/SVG/main" r:embed="rId4"/>
               </a:ext>
             </a:extLst>
           </a:blip>
@@ -7834,13 +7781,6 @@
   <p:clrMapOvr>
     <a:masterClrMapping/>
   </p:clrMapOvr>
-  <p:timing>
-    <p:tnLst>
-      <p:par>
-        <p:cTn id="1" dur="indefinite" restart="never" nodeType="tmRoot"/>
-      </p:par>
-    </p:tnLst>
-  </p:timing>
 </p:sld>
 </file>
 
@@ -7866,7 +7806,7 @@
           <p:cNvPr id="2" name="Título 1">
             <a:extLst>
               <a:ext uri="{FF2B5EF4-FFF2-40B4-BE49-F238E27FC236}">
-                <a16:creationId xmlns:a16="http://schemas.microsoft.com/office/drawing/2014/main" xmlns="" id="{F2153DD3-C27C-457D-ADDD-066D01CB95CA}"/>
+                <a16:creationId xmlns:a16="http://schemas.microsoft.com/office/drawing/2014/main" id="{F2153DD3-C27C-457D-ADDD-066D01CB95CA}"/>
               </a:ext>
             </a:extLst>
           </p:cNvPr>
@@ -7917,7 +7857,7 @@
           <p:cNvPr id="4" name="Marcador de contenido 3">
             <a:extLst>
               <a:ext uri="{FF2B5EF4-FFF2-40B4-BE49-F238E27FC236}">
-                <a16:creationId xmlns:a16="http://schemas.microsoft.com/office/drawing/2014/main" xmlns="" id="{31F44B22-324B-4DE8-B32C-85312184904C}"/>
+                <a16:creationId xmlns:a16="http://schemas.microsoft.com/office/drawing/2014/main" id="{31F44B22-324B-4DE8-B32C-85312184904C}"/>
               </a:ext>
             </a:extLst>
           </p:cNvPr>
@@ -7947,7 +7887,7 @@
                 <a:gridCol w="8345244">
                   <a:extLst>
                     <a:ext uri="{9D8B030D-6E8A-4147-A177-3AD203B41FA5}">
-                      <a16:colId xmlns:a16="http://schemas.microsoft.com/office/drawing/2014/main" xmlns="" val="743422230"/>
+                      <a16:colId xmlns:a16="http://schemas.microsoft.com/office/drawing/2014/main" val="743422230"/>
                     </a:ext>
                   </a:extLst>
                 </a:gridCol>
@@ -8151,7 +8091,7 @@
                 </a:tc>
                 <a:extLst>
                   <a:ext uri="{0D108BD9-81ED-4DB2-BD59-A6C34878D82A}">
-                    <a16:rowId xmlns:a16="http://schemas.microsoft.com/office/drawing/2014/main" xmlns="" val="744739329"/>
+                    <a16:rowId xmlns:a16="http://schemas.microsoft.com/office/drawing/2014/main" val="744739329"/>
                   </a:ext>
                 </a:extLst>
               </a:tr>
@@ -8164,7 +8104,7 @@
           <p:cNvPr id="5" name="Gráfico 4" descr="Lápiz">
             <a:extLst>
               <a:ext uri="{FF2B5EF4-FFF2-40B4-BE49-F238E27FC236}">
-                <a16:creationId xmlns:a16="http://schemas.microsoft.com/office/drawing/2014/main" xmlns="" id="{0A74E1BB-B1CA-413B-8313-F68AA049A917}"/>
+                <a16:creationId xmlns:a16="http://schemas.microsoft.com/office/drawing/2014/main" id="{0A74E1BB-B1CA-413B-8313-F68AA049A917}"/>
               </a:ext>
             </a:extLst>
           </p:cNvPr>
@@ -8177,7 +8117,7 @@
           <a:blip r:embed="rId3">
             <a:extLst>
               <a:ext uri="{96DAC541-7B7A-43D3-8B79-37D633B846F1}">
-                <asvg:svgBlip xmlns:asvg="http://schemas.microsoft.com/office/drawing/2016/SVG/main" xmlns="" r:embed="rId4"/>
+                <asvg:svgBlip xmlns:asvg="http://schemas.microsoft.com/office/drawing/2016/SVG/main" r:embed="rId4"/>
               </a:ext>
             </a:extLst>
           </a:blip>
@@ -8205,13 +8145,6 @@
   <p:clrMapOvr>
     <a:masterClrMapping/>
   </p:clrMapOvr>
-  <p:timing>
-    <p:tnLst>
-      <p:par>
-        <p:cTn id="1" dur="indefinite" restart="never" nodeType="tmRoot"/>
-      </p:par>
-    </p:tnLst>
-  </p:timing>
 </p:sld>
 </file>
 
@@ -8237,7 +8170,7 @@
           <p:cNvPr id="2" name="Título 1">
             <a:extLst>
               <a:ext uri="{FF2B5EF4-FFF2-40B4-BE49-F238E27FC236}">
-                <a16:creationId xmlns:a16="http://schemas.microsoft.com/office/drawing/2014/main" xmlns="" id="{F2153DD3-C27C-457D-ADDD-066D01CB95CA}"/>
+                <a16:creationId xmlns:a16="http://schemas.microsoft.com/office/drawing/2014/main" id="{F2153DD3-C27C-457D-ADDD-066D01CB95CA}"/>
               </a:ext>
             </a:extLst>
           </p:cNvPr>
@@ -8277,7 +8210,7 @@
           <p:cNvPr id="4" name="Marcador de contenido 3">
             <a:extLst>
               <a:ext uri="{FF2B5EF4-FFF2-40B4-BE49-F238E27FC236}">
-                <a16:creationId xmlns:a16="http://schemas.microsoft.com/office/drawing/2014/main" xmlns="" id="{31F44B22-324B-4DE8-B32C-85312184904C}"/>
+                <a16:creationId xmlns:a16="http://schemas.microsoft.com/office/drawing/2014/main" id="{31F44B22-324B-4DE8-B32C-85312184904C}"/>
               </a:ext>
             </a:extLst>
           </p:cNvPr>
@@ -8307,7 +8240,7 @@
                 <a:gridCol w="8345244">
                   <a:extLst>
                     <a:ext uri="{9D8B030D-6E8A-4147-A177-3AD203B41FA5}">
-                      <a16:colId xmlns:a16="http://schemas.microsoft.com/office/drawing/2014/main" xmlns="" val="743422230"/>
+                      <a16:colId xmlns:a16="http://schemas.microsoft.com/office/drawing/2014/main" val="743422230"/>
                     </a:ext>
                   </a:extLst>
                 </a:gridCol>
@@ -8403,7 +8336,7 @@
                 </a:tc>
                 <a:extLst>
                   <a:ext uri="{0D108BD9-81ED-4DB2-BD59-A6C34878D82A}">
-                    <a16:rowId xmlns:a16="http://schemas.microsoft.com/office/drawing/2014/main" xmlns="" val="744739329"/>
+                    <a16:rowId xmlns:a16="http://schemas.microsoft.com/office/drawing/2014/main" val="744739329"/>
                   </a:ext>
                 </a:extLst>
               </a:tr>
@@ -8416,7 +8349,7 @@
           <p:cNvPr id="5" name="Gráfico 4" descr="Lápiz">
             <a:extLst>
               <a:ext uri="{FF2B5EF4-FFF2-40B4-BE49-F238E27FC236}">
-                <a16:creationId xmlns:a16="http://schemas.microsoft.com/office/drawing/2014/main" xmlns="" id="{0A74E1BB-B1CA-413B-8313-F68AA049A917}"/>
+                <a16:creationId xmlns:a16="http://schemas.microsoft.com/office/drawing/2014/main" id="{0A74E1BB-B1CA-413B-8313-F68AA049A917}"/>
               </a:ext>
             </a:extLst>
           </p:cNvPr>
@@ -8429,7 +8362,7 @@
           <a:blip r:embed="rId3">
             <a:extLst>
               <a:ext uri="{96DAC541-7B7A-43D3-8B79-37D633B846F1}">
-                <asvg:svgBlip xmlns:asvg="http://schemas.microsoft.com/office/drawing/2016/SVG/main" xmlns="" r:embed="rId4"/>
+                <asvg:svgBlip xmlns:asvg="http://schemas.microsoft.com/office/drawing/2016/SVG/main" r:embed="rId4"/>
               </a:ext>
             </a:extLst>
           </a:blip>
@@ -8457,13 +8390,6 @@
   <p:clrMapOvr>
     <a:masterClrMapping/>
   </p:clrMapOvr>
-  <p:timing>
-    <p:tnLst>
-      <p:par>
-        <p:cTn id="1" dur="indefinite" restart="never" nodeType="tmRoot"/>
-      </p:par>
-    </p:tnLst>
-  </p:timing>
 </p:sld>
 </file>
 
@@ -8489,7 +8415,7 @@
           <p:cNvPr id="2" name="Título 1">
             <a:extLst>
               <a:ext uri="{FF2B5EF4-FFF2-40B4-BE49-F238E27FC236}">
-                <a16:creationId xmlns:a16="http://schemas.microsoft.com/office/drawing/2014/main" xmlns="" id="{F2153DD3-C27C-457D-ADDD-066D01CB95CA}"/>
+                <a16:creationId xmlns:a16="http://schemas.microsoft.com/office/drawing/2014/main" id="{F2153DD3-C27C-457D-ADDD-066D01CB95CA}"/>
               </a:ext>
             </a:extLst>
           </p:cNvPr>
@@ -8540,7 +8466,7 @@
           <p:cNvPr id="4" name="Marcador de contenido 3">
             <a:extLst>
               <a:ext uri="{FF2B5EF4-FFF2-40B4-BE49-F238E27FC236}">
-                <a16:creationId xmlns:a16="http://schemas.microsoft.com/office/drawing/2014/main" xmlns="" id="{31F44B22-324B-4DE8-B32C-85312184904C}"/>
+                <a16:creationId xmlns:a16="http://schemas.microsoft.com/office/drawing/2014/main" id="{31F44B22-324B-4DE8-B32C-85312184904C}"/>
               </a:ext>
             </a:extLst>
           </p:cNvPr>
@@ -8570,7 +8496,7 @@
                 <a:gridCol w="8345244">
                   <a:extLst>
                     <a:ext uri="{9D8B030D-6E8A-4147-A177-3AD203B41FA5}">
-                      <a16:colId xmlns:a16="http://schemas.microsoft.com/office/drawing/2014/main" xmlns="" val="743422230"/>
+                      <a16:colId xmlns:a16="http://schemas.microsoft.com/office/drawing/2014/main" val="743422230"/>
                     </a:ext>
                   </a:extLst>
                 </a:gridCol>
@@ -8753,7 +8679,7 @@
                 </a:tc>
                 <a:extLst>
                   <a:ext uri="{0D108BD9-81ED-4DB2-BD59-A6C34878D82A}">
-                    <a16:rowId xmlns:a16="http://schemas.microsoft.com/office/drawing/2014/main" xmlns="" val="744739329"/>
+                    <a16:rowId xmlns:a16="http://schemas.microsoft.com/office/drawing/2014/main" val="744739329"/>
                   </a:ext>
                 </a:extLst>
               </a:tr>
@@ -8766,7 +8692,7 @@
           <p:cNvPr id="5" name="Gráfico 4" descr="Lápiz">
             <a:extLst>
               <a:ext uri="{FF2B5EF4-FFF2-40B4-BE49-F238E27FC236}">
-                <a16:creationId xmlns:a16="http://schemas.microsoft.com/office/drawing/2014/main" xmlns="" id="{0A74E1BB-B1CA-413B-8313-F68AA049A917}"/>
+                <a16:creationId xmlns:a16="http://schemas.microsoft.com/office/drawing/2014/main" id="{0A74E1BB-B1CA-413B-8313-F68AA049A917}"/>
               </a:ext>
             </a:extLst>
           </p:cNvPr>
@@ -8779,7 +8705,7 @@
           <a:blip r:embed="rId3">
             <a:extLst>
               <a:ext uri="{96DAC541-7B7A-43D3-8B79-37D633B846F1}">
-                <asvg:svgBlip xmlns:asvg="http://schemas.microsoft.com/office/drawing/2016/SVG/main" xmlns="" r:embed="rId4"/>
+                <asvg:svgBlip xmlns:asvg="http://schemas.microsoft.com/office/drawing/2016/SVG/main" r:embed="rId4"/>
               </a:ext>
             </a:extLst>
           </a:blip>
@@ -8807,13 +8733,6 @@
   <p:clrMapOvr>
     <a:masterClrMapping/>
   </p:clrMapOvr>
-  <p:timing>
-    <p:tnLst>
-      <p:par>
-        <p:cTn id="1" dur="indefinite" restart="never" nodeType="tmRoot"/>
-      </p:par>
-    </p:tnLst>
-  </p:timing>
 </p:sld>
 </file>
 
@@ -8839,7 +8758,7 @@
           <p:cNvPr id="2" name="Título 1">
             <a:extLst>
               <a:ext uri="{FF2B5EF4-FFF2-40B4-BE49-F238E27FC236}">
-                <a16:creationId xmlns:a16="http://schemas.microsoft.com/office/drawing/2014/main" xmlns="" id="{F2153DD3-C27C-457D-ADDD-066D01CB95CA}"/>
+                <a16:creationId xmlns:a16="http://schemas.microsoft.com/office/drawing/2014/main" id="{F2153DD3-C27C-457D-ADDD-066D01CB95CA}"/>
               </a:ext>
             </a:extLst>
           </p:cNvPr>
@@ -8872,7 +8791,7 @@
           <p:cNvPr id="4" name="Marcador de contenido 3">
             <a:extLst>
               <a:ext uri="{FF2B5EF4-FFF2-40B4-BE49-F238E27FC236}">
-                <a16:creationId xmlns:a16="http://schemas.microsoft.com/office/drawing/2014/main" xmlns="" id="{31F44B22-324B-4DE8-B32C-85312184904C}"/>
+                <a16:creationId xmlns:a16="http://schemas.microsoft.com/office/drawing/2014/main" id="{31F44B22-324B-4DE8-B32C-85312184904C}"/>
               </a:ext>
             </a:extLst>
           </p:cNvPr>
@@ -8890,7 +8809,7 @@
         </p:nvGraphicFramePr>
         <p:xfrm>
           <a:off x="855108" y="1476375"/>
-          <a:ext cx="7406640" cy="3726640"/>
+          <a:ext cx="7406640" cy="3683143"/>
         </p:xfrm>
         <a:graphic>
           <a:graphicData uri="http://schemas.openxmlformats.org/drawingml/2006/table">
@@ -8902,7 +8821,7 @@
                 <a:gridCol w="7406640">
                   <a:extLst>
                     <a:ext uri="{9D8B030D-6E8A-4147-A177-3AD203B41FA5}">
-                      <a16:colId xmlns:a16="http://schemas.microsoft.com/office/drawing/2014/main" xmlns="" val="743422230"/>
+                      <a16:colId xmlns:a16="http://schemas.microsoft.com/office/drawing/2014/main" val="743422230"/>
                     </a:ext>
                   </a:extLst>
                 </a:gridCol>
@@ -8947,7 +8866,7 @@
                 </a:tc>
                 <a:extLst>
                   <a:ext uri="{0D108BD9-81ED-4DB2-BD59-A6C34878D82A}">
-                    <a16:rowId xmlns:a16="http://schemas.microsoft.com/office/drawing/2014/main" xmlns="" val="2496822786"/>
+                    <a16:rowId xmlns:a16="http://schemas.microsoft.com/office/drawing/2014/main" val="2496822786"/>
                   </a:ext>
                 </a:extLst>
               </a:tr>
@@ -9045,7 +8964,7 @@
                         <a:hlinkClick r:id="rId3">
                           <a:extLst>
                             <a:ext uri="{A12FA001-AC4F-418D-AE19-62706E023703}">
-                              <ahyp:hlinkClr xmlns:ahyp="http://schemas.microsoft.com/office/drawing/2018/hyperlinkcolor" xmlns="" val="tx"/>
+                              <ahyp:hlinkClr xmlns:ahyp="http://schemas.microsoft.com/office/drawing/2018/hyperlinkcolor" val="tx"/>
                             </a:ext>
                           </a:extLst>
                         </a:hlinkClick>
@@ -9080,7 +8999,7 @@
                 </a:tc>
                 <a:extLst>
                   <a:ext uri="{0D108BD9-81ED-4DB2-BD59-A6C34878D82A}">
-                    <a16:rowId xmlns:a16="http://schemas.microsoft.com/office/drawing/2014/main" xmlns="" val="744739329"/>
+                    <a16:rowId xmlns:a16="http://schemas.microsoft.com/office/drawing/2014/main" val="744739329"/>
                   </a:ext>
                 </a:extLst>
               </a:tr>
@@ -9098,13 +9017,6 @@
   <p:clrMapOvr>
     <a:masterClrMapping/>
   </p:clrMapOvr>
-  <p:timing>
-    <p:tnLst>
-      <p:par>
-        <p:cTn id="1" dur="indefinite" restart="never" nodeType="tmRoot"/>
-      </p:par>
-    </p:tnLst>
-  </p:timing>
 </p:sld>
 </file>
 
@@ -9130,7 +9042,7 @@
           <p:cNvPr id="2" name="Título 1">
             <a:extLst>
               <a:ext uri="{FF2B5EF4-FFF2-40B4-BE49-F238E27FC236}">
-                <a16:creationId xmlns:a16="http://schemas.microsoft.com/office/drawing/2014/main" xmlns="" id="{F2153DD3-C27C-457D-ADDD-066D01CB95CA}"/>
+                <a16:creationId xmlns:a16="http://schemas.microsoft.com/office/drawing/2014/main" id="{F2153DD3-C27C-457D-ADDD-066D01CB95CA}"/>
               </a:ext>
             </a:extLst>
           </p:cNvPr>
@@ -9170,7 +9082,7 @@
           <p:cNvPr id="4" name="Marcador de contenido 3">
             <a:extLst>
               <a:ext uri="{FF2B5EF4-FFF2-40B4-BE49-F238E27FC236}">
-                <a16:creationId xmlns:a16="http://schemas.microsoft.com/office/drawing/2014/main" xmlns="" id="{31F44B22-324B-4DE8-B32C-85312184904C}"/>
+                <a16:creationId xmlns:a16="http://schemas.microsoft.com/office/drawing/2014/main" id="{31F44B22-324B-4DE8-B32C-85312184904C}"/>
               </a:ext>
             </a:extLst>
           </p:cNvPr>
@@ -9200,7 +9112,7 @@
                 <a:gridCol w="8368104">
                   <a:extLst>
                     <a:ext uri="{9D8B030D-6E8A-4147-A177-3AD203B41FA5}">
-                      <a16:colId xmlns:a16="http://schemas.microsoft.com/office/drawing/2014/main" xmlns="" val="743422230"/>
+                      <a16:colId xmlns:a16="http://schemas.microsoft.com/office/drawing/2014/main" val="743422230"/>
                     </a:ext>
                   </a:extLst>
                 </a:gridCol>
@@ -9467,7 +9379,7 @@
                 </a:tc>
                 <a:extLst>
                   <a:ext uri="{0D108BD9-81ED-4DB2-BD59-A6C34878D82A}">
-                    <a16:rowId xmlns:a16="http://schemas.microsoft.com/office/drawing/2014/main" xmlns="" val="744739329"/>
+                    <a16:rowId xmlns:a16="http://schemas.microsoft.com/office/drawing/2014/main" val="744739329"/>
                   </a:ext>
                 </a:extLst>
               </a:tr>
@@ -9480,7 +9392,7 @@
           <p:cNvPr id="5" name="Gráfico 4" descr="Lápiz">
             <a:extLst>
               <a:ext uri="{FF2B5EF4-FFF2-40B4-BE49-F238E27FC236}">
-                <a16:creationId xmlns:a16="http://schemas.microsoft.com/office/drawing/2014/main" xmlns="" id="{0A74E1BB-B1CA-413B-8313-F68AA049A917}"/>
+                <a16:creationId xmlns:a16="http://schemas.microsoft.com/office/drawing/2014/main" id="{0A74E1BB-B1CA-413B-8313-F68AA049A917}"/>
               </a:ext>
             </a:extLst>
           </p:cNvPr>
@@ -9493,7 +9405,7 @@
           <a:blip r:embed="rId3">
             <a:extLst>
               <a:ext uri="{96DAC541-7B7A-43D3-8B79-37D633B846F1}">
-                <asvg:svgBlip xmlns:asvg="http://schemas.microsoft.com/office/drawing/2016/SVG/main" xmlns="" r:embed="rId4"/>
+                <asvg:svgBlip xmlns:asvg="http://schemas.microsoft.com/office/drawing/2016/SVG/main" r:embed="rId4"/>
               </a:ext>
             </a:extLst>
           </a:blip>
@@ -9521,13 +9433,6 @@
   <p:clrMapOvr>
     <a:masterClrMapping/>
   </p:clrMapOvr>
-  <p:timing>
-    <p:tnLst>
-      <p:par>
-        <p:cTn id="1" dur="indefinite" restart="never" nodeType="tmRoot"/>
-      </p:par>
-    </p:tnLst>
-  </p:timing>
 </p:sld>
 </file>
 
@@ -9553,7 +9458,7 @@
           <p:cNvPr id="2" name="Título 1">
             <a:extLst>
               <a:ext uri="{FF2B5EF4-FFF2-40B4-BE49-F238E27FC236}">
-                <a16:creationId xmlns:a16="http://schemas.microsoft.com/office/drawing/2014/main" xmlns="" id="{F2153DD3-C27C-457D-ADDD-066D01CB95CA}"/>
+                <a16:creationId xmlns:a16="http://schemas.microsoft.com/office/drawing/2014/main" id="{F2153DD3-C27C-457D-ADDD-066D01CB95CA}"/>
               </a:ext>
             </a:extLst>
           </p:cNvPr>
@@ -9609,7 +9514,7 @@
           <p:cNvPr id="4" name="Marcador de contenido 3">
             <a:extLst>
               <a:ext uri="{FF2B5EF4-FFF2-40B4-BE49-F238E27FC236}">
-                <a16:creationId xmlns:a16="http://schemas.microsoft.com/office/drawing/2014/main" xmlns="" id="{31F44B22-324B-4DE8-B32C-85312184904C}"/>
+                <a16:creationId xmlns:a16="http://schemas.microsoft.com/office/drawing/2014/main" id="{31F44B22-324B-4DE8-B32C-85312184904C}"/>
               </a:ext>
             </a:extLst>
           </p:cNvPr>
@@ -9639,7 +9544,7 @@
                 <a:gridCol w="8368104">
                   <a:extLst>
                     <a:ext uri="{9D8B030D-6E8A-4147-A177-3AD203B41FA5}">
-                      <a16:colId xmlns:a16="http://schemas.microsoft.com/office/drawing/2014/main" xmlns="" val="743422230"/>
+                      <a16:colId xmlns:a16="http://schemas.microsoft.com/office/drawing/2014/main" val="743422230"/>
                     </a:ext>
                   </a:extLst>
                 </a:gridCol>
@@ -9790,7 +9695,7 @@
                 </a:tc>
                 <a:extLst>
                   <a:ext uri="{0D108BD9-81ED-4DB2-BD59-A6C34878D82A}">
-                    <a16:rowId xmlns:a16="http://schemas.microsoft.com/office/drawing/2014/main" xmlns="" val="744739329"/>
+                    <a16:rowId xmlns:a16="http://schemas.microsoft.com/office/drawing/2014/main" val="744739329"/>
                   </a:ext>
                 </a:extLst>
               </a:tr>
@@ -9808,13 +9713,6 @@
   <p:clrMapOvr>
     <a:masterClrMapping/>
   </p:clrMapOvr>
-  <p:timing>
-    <p:tnLst>
-      <p:par>
-        <p:cTn id="1" dur="indefinite" restart="never" nodeType="tmRoot"/>
-      </p:par>
-    </p:tnLst>
-  </p:timing>
 </p:sld>
 </file>
 
@@ -9840,7 +9738,7 @@
           <p:cNvPr id="2" name="Título 1">
             <a:extLst>
               <a:ext uri="{FF2B5EF4-FFF2-40B4-BE49-F238E27FC236}">
-                <a16:creationId xmlns:a16="http://schemas.microsoft.com/office/drawing/2014/main" xmlns="" id="{F2153DD3-C27C-457D-ADDD-066D01CB95CA}"/>
+                <a16:creationId xmlns:a16="http://schemas.microsoft.com/office/drawing/2014/main" id="{F2153DD3-C27C-457D-ADDD-066D01CB95CA}"/>
               </a:ext>
             </a:extLst>
           </p:cNvPr>
@@ -9896,7 +9794,7 @@
           <p:cNvPr id="4" name="Marcador de contenido 3">
             <a:extLst>
               <a:ext uri="{FF2B5EF4-FFF2-40B4-BE49-F238E27FC236}">
-                <a16:creationId xmlns:a16="http://schemas.microsoft.com/office/drawing/2014/main" xmlns="" id="{31F44B22-324B-4DE8-B32C-85312184904C}"/>
+                <a16:creationId xmlns:a16="http://schemas.microsoft.com/office/drawing/2014/main" id="{31F44B22-324B-4DE8-B32C-85312184904C}"/>
               </a:ext>
             </a:extLst>
           </p:cNvPr>
@@ -9926,7 +9824,7 @@
                 <a:gridCol w="8368104">
                   <a:extLst>
                     <a:ext uri="{9D8B030D-6E8A-4147-A177-3AD203B41FA5}">
-                      <a16:colId xmlns:a16="http://schemas.microsoft.com/office/drawing/2014/main" xmlns="" val="743422230"/>
+                      <a16:colId xmlns:a16="http://schemas.microsoft.com/office/drawing/2014/main" val="743422230"/>
                     </a:ext>
                   </a:extLst>
                 </a:gridCol>
@@ -10052,7 +9950,7 @@
                 </a:tc>
                 <a:extLst>
                   <a:ext uri="{0D108BD9-81ED-4DB2-BD59-A6C34878D82A}">
-                    <a16:rowId xmlns:a16="http://schemas.microsoft.com/office/drawing/2014/main" xmlns="" val="744739329"/>
+                    <a16:rowId xmlns:a16="http://schemas.microsoft.com/office/drawing/2014/main" val="744739329"/>
                   </a:ext>
                 </a:extLst>
               </a:tr>
@@ -10070,13 +9968,6 @@
   <p:clrMapOvr>
     <a:masterClrMapping/>
   </p:clrMapOvr>
-  <p:timing>
-    <p:tnLst>
-      <p:par>
-        <p:cTn id="1" dur="indefinite" restart="never" nodeType="tmRoot"/>
-      </p:par>
-    </p:tnLst>
-  </p:timing>
 </p:sld>
 </file>
 
@@ -10102,7 +9993,7 @@
           <p:cNvPr id="2" name="Título 1">
             <a:extLst>
               <a:ext uri="{FF2B5EF4-FFF2-40B4-BE49-F238E27FC236}">
-                <a16:creationId xmlns:a16="http://schemas.microsoft.com/office/drawing/2014/main" xmlns="" id="{F2153DD3-C27C-457D-ADDD-066D01CB95CA}"/>
+                <a16:creationId xmlns:a16="http://schemas.microsoft.com/office/drawing/2014/main" id="{F2153DD3-C27C-457D-ADDD-066D01CB95CA}"/>
               </a:ext>
             </a:extLst>
           </p:cNvPr>
@@ -10142,12 +10033,6 @@
               </a:rPr>
               <a:t>2.1. El conocimiento doctrinal proporciona lo necesario para una exposición correcta de la verdad</a:t>
             </a:r>
-            <a:r>
-              <a:rPr lang="es-VE" dirty="0">
-                <a:latin typeface="Rockwell" panose="02060603020205020403" pitchFamily="18" charset="0"/>
-              </a:rPr>
-              <a:t/>
-            </a:r>
             <a:br>
               <a:rPr lang="es-VE" dirty="0">
                 <a:latin typeface="Rockwell" panose="02060603020205020403" pitchFamily="18" charset="0"/>
@@ -10164,7 +10049,7 @@
           <p:cNvPr id="4" name="Marcador de contenido 3">
             <a:extLst>
               <a:ext uri="{FF2B5EF4-FFF2-40B4-BE49-F238E27FC236}">
-                <a16:creationId xmlns:a16="http://schemas.microsoft.com/office/drawing/2014/main" xmlns="" id="{31F44B22-324B-4DE8-B32C-85312184904C}"/>
+                <a16:creationId xmlns:a16="http://schemas.microsoft.com/office/drawing/2014/main" id="{31F44B22-324B-4DE8-B32C-85312184904C}"/>
               </a:ext>
             </a:extLst>
           </p:cNvPr>
@@ -10194,7 +10079,7 @@
                 <a:gridCol w="8368104">
                   <a:extLst>
                     <a:ext uri="{9D8B030D-6E8A-4147-A177-3AD203B41FA5}">
-                      <a16:colId xmlns:a16="http://schemas.microsoft.com/office/drawing/2014/main" xmlns="" val="743422230"/>
+                      <a16:colId xmlns:a16="http://schemas.microsoft.com/office/drawing/2014/main" val="743422230"/>
                     </a:ext>
                   </a:extLst>
                 </a:gridCol>
@@ -10320,7 +10205,7 @@
                 </a:tc>
                 <a:extLst>
                   <a:ext uri="{0D108BD9-81ED-4DB2-BD59-A6C34878D82A}">
-                    <a16:rowId xmlns:a16="http://schemas.microsoft.com/office/drawing/2014/main" xmlns="" val="744739329"/>
+                    <a16:rowId xmlns:a16="http://schemas.microsoft.com/office/drawing/2014/main" val="744739329"/>
                   </a:ext>
                 </a:extLst>
               </a:tr>
@@ -10333,7 +10218,7 @@
           <p:cNvPr id="5" name="Gráfico 4" descr="Lápiz">
             <a:extLst>
               <a:ext uri="{FF2B5EF4-FFF2-40B4-BE49-F238E27FC236}">
-                <a16:creationId xmlns:a16="http://schemas.microsoft.com/office/drawing/2014/main" xmlns="" id="{0A74E1BB-B1CA-413B-8313-F68AA049A917}"/>
+                <a16:creationId xmlns:a16="http://schemas.microsoft.com/office/drawing/2014/main" id="{0A74E1BB-B1CA-413B-8313-F68AA049A917}"/>
               </a:ext>
             </a:extLst>
           </p:cNvPr>
@@ -10346,7 +10231,7 @@
           <a:blip r:embed="rId3">
             <a:extLst>
               <a:ext uri="{96DAC541-7B7A-43D3-8B79-37D633B846F1}">
-                <asvg:svgBlip xmlns:asvg="http://schemas.microsoft.com/office/drawing/2016/SVG/main" xmlns="" r:embed="rId4"/>
+                <asvg:svgBlip xmlns:asvg="http://schemas.microsoft.com/office/drawing/2016/SVG/main" r:embed="rId4"/>
               </a:ext>
             </a:extLst>
           </a:blip>
@@ -10374,13 +10259,6 @@
   <p:clrMapOvr>
     <a:masterClrMapping/>
   </p:clrMapOvr>
-  <p:timing>
-    <p:tnLst>
-      <p:par>
-        <p:cTn id="1" dur="indefinite" restart="never" nodeType="tmRoot"/>
-      </p:par>
-    </p:tnLst>
-  </p:timing>
 </p:sld>
 </file>
 
@@ -10406,7 +10284,7 @@
           <p:cNvPr id="2" name="Título 1">
             <a:extLst>
               <a:ext uri="{FF2B5EF4-FFF2-40B4-BE49-F238E27FC236}">
-                <a16:creationId xmlns:a16="http://schemas.microsoft.com/office/drawing/2014/main" xmlns="" id="{F2153DD3-C27C-457D-ADDD-066D01CB95CA}"/>
+                <a16:creationId xmlns:a16="http://schemas.microsoft.com/office/drawing/2014/main" id="{F2153DD3-C27C-457D-ADDD-066D01CB95CA}"/>
               </a:ext>
             </a:extLst>
           </p:cNvPr>
@@ -10457,7 +10335,7 @@
           <p:cNvPr id="4" name="Marcador de contenido 3">
             <a:extLst>
               <a:ext uri="{FF2B5EF4-FFF2-40B4-BE49-F238E27FC236}">
-                <a16:creationId xmlns:a16="http://schemas.microsoft.com/office/drawing/2014/main" xmlns="" id="{31F44B22-324B-4DE8-B32C-85312184904C}"/>
+                <a16:creationId xmlns:a16="http://schemas.microsoft.com/office/drawing/2014/main" id="{31F44B22-324B-4DE8-B32C-85312184904C}"/>
               </a:ext>
             </a:extLst>
           </p:cNvPr>
@@ -10487,7 +10365,7 @@
                 <a:gridCol w="8368104">
                   <a:extLst>
                     <a:ext uri="{9D8B030D-6E8A-4147-A177-3AD203B41FA5}">
-                      <a16:colId xmlns:a16="http://schemas.microsoft.com/office/drawing/2014/main" xmlns="" val="743422230"/>
+                      <a16:colId xmlns:a16="http://schemas.microsoft.com/office/drawing/2014/main" val="743422230"/>
                     </a:ext>
                   </a:extLst>
                 </a:gridCol>
@@ -10577,7 +10455,7 @@
                 </a:tc>
                 <a:extLst>
                   <a:ext uri="{0D108BD9-81ED-4DB2-BD59-A6C34878D82A}">
-                    <a16:rowId xmlns:a16="http://schemas.microsoft.com/office/drawing/2014/main" xmlns="" val="744739329"/>
+                    <a16:rowId xmlns:a16="http://schemas.microsoft.com/office/drawing/2014/main" val="744739329"/>
                   </a:ext>
                 </a:extLst>
               </a:tr>
@@ -10590,7 +10468,7 @@
           <p:cNvPr id="5" name="Gráfico 4" descr="Lápiz">
             <a:extLst>
               <a:ext uri="{FF2B5EF4-FFF2-40B4-BE49-F238E27FC236}">
-                <a16:creationId xmlns:a16="http://schemas.microsoft.com/office/drawing/2014/main" xmlns="" id="{0A74E1BB-B1CA-413B-8313-F68AA049A917}"/>
+                <a16:creationId xmlns:a16="http://schemas.microsoft.com/office/drawing/2014/main" id="{0A74E1BB-B1CA-413B-8313-F68AA049A917}"/>
               </a:ext>
             </a:extLst>
           </p:cNvPr>
@@ -10603,7 +10481,7 @@
           <a:blip r:embed="rId3">
             <a:extLst>
               <a:ext uri="{96DAC541-7B7A-43D3-8B79-37D633B846F1}">
-                <asvg:svgBlip xmlns:asvg="http://schemas.microsoft.com/office/drawing/2016/SVG/main" xmlns="" r:embed="rId4"/>
+                <asvg:svgBlip xmlns:asvg="http://schemas.microsoft.com/office/drawing/2016/SVG/main" r:embed="rId4"/>
               </a:ext>
             </a:extLst>
           </a:blip>
@@ -10631,13 +10509,6 @@
   <p:clrMapOvr>
     <a:masterClrMapping/>
   </p:clrMapOvr>
-  <p:timing>
-    <p:tnLst>
-      <p:par>
-        <p:cTn id="1" dur="indefinite" restart="never" nodeType="tmRoot"/>
-      </p:par>
-    </p:tnLst>
-  </p:timing>
 </p:sld>
 </file>
 
@@ -10663,7 +10534,7 @@
           <p:cNvPr id="2" name="Título 1">
             <a:extLst>
               <a:ext uri="{FF2B5EF4-FFF2-40B4-BE49-F238E27FC236}">
-                <a16:creationId xmlns:a16="http://schemas.microsoft.com/office/drawing/2014/main" xmlns="" id="{F2153DD3-C27C-457D-ADDD-066D01CB95CA}"/>
+                <a16:creationId xmlns:a16="http://schemas.microsoft.com/office/drawing/2014/main" id="{F2153DD3-C27C-457D-ADDD-066D01CB95CA}"/>
               </a:ext>
             </a:extLst>
           </p:cNvPr>
@@ -10714,7 +10585,7 @@
           <p:cNvPr id="4" name="Marcador de contenido 3">
             <a:extLst>
               <a:ext uri="{FF2B5EF4-FFF2-40B4-BE49-F238E27FC236}">
-                <a16:creationId xmlns:a16="http://schemas.microsoft.com/office/drawing/2014/main" xmlns="" id="{31F44B22-324B-4DE8-B32C-85312184904C}"/>
+                <a16:creationId xmlns:a16="http://schemas.microsoft.com/office/drawing/2014/main" id="{31F44B22-324B-4DE8-B32C-85312184904C}"/>
               </a:ext>
             </a:extLst>
           </p:cNvPr>
@@ -10744,7 +10615,7 @@
                 <a:gridCol w="8345244">
                   <a:extLst>
                     <a:ext uri="{9D8B030D-6E8A-4147-A177-3AD203B41FA5}">
-                      <a16:colId xmlns:a16="http://schemas.microsoft.com/office/drawing/2014/main" xmlns="" val="743422230"/>
+                      <a16:colId xmlns:a16="http://schemas.microsoft.com/office/drawing/2014/main" val="743422230"/>
                     </a:ext>
                   </a:extLst>
                 </a:gridCol>
@@ -10881,7 +10752,7 @@
                 </a:tc>
                 <a:extLst>
                   <a:ext uri="{0D108BD9-81ED-4DB2-BD59-A6C34878D82A}">
-                    <a16:rowId xmlns:a16="http://schemas.microsoft.com/office/drawing/2014/main" xmlns="" val="744739329"/>
+                    <a16:rowId xmlns:a16="http://schemas.microsoft.com/office/drawing/2014/main" val="744739329"/>
                   </a:ext>
                 </a:extLst>
               </a:tr>
@@ -10894,7 +10765,7 @@
           <p:cNvPr id="5" name="Gráfico 4" descr="Lápiz">
             <a:extLst>
               <a:ext uri="{FF2B5EF4-FFF2-40B4-BE49-F238E27FC236}">
-                <a16:creationId xmlns:a16="http://schemas.microsoft.com/office/drawing/2014/main" xmlns="" id="{0A74E1BB-B1CA-413B-8313-F68AA049A917}"/>
+                <a16:creationId xmlns:a16="http://schemas.microsoft.com/office/drawing/2014/main" id="{0A74E1BB-B1CA-413B-8313-F68AA049A917}"/>
               </a:ext>
             </a:extLst>
           </p:cNvPr>
@@ -10907,7 +10778,7 @@
           <a:blip r:embed="rId3">
             <a:extLst>
               <a:ext uri="{96DAC541-7B7A-43D3-8B79-37D633B846F1}">
-                <asvg:svgBlip xmlns:asvg="http://schemas.microsoft.com/office/drawing/2016/SVG/main" xmlns="" r:embed="rId4"/>
+                <asvg:svgBlip xmlns:asvg="http://schemas.microsoft.com/office/drawing/2016/SVG/main" r:embed="rId4"/>
               </a:ext>
             </a:extLst>
           </a:blip>
@@ -10935,13 +10806,6 @@
   <p:clrMapOvr>
     <a:masterClrMapping/>
   </p:clrMapOvr>
-  <p:timing>
-    <p:tnLst>
-      <p:par>
-        <p:cTn id="1" dur="indefinite" restart="never" nodeType="tmRoot"/>
-      </p:par>
-    </p:tnLst>
-  </p:timing>
 </p:sld>
 </file>
 
@@ -10967,7 +10831,7 @@
           <p:cNvPr id="2" name="Título 1">
             <a:extLst>
               <a:ext uri="{FF2B5EF4-FFF2-40B4-BE49-F238E27FC236}">
-                <a16:creationId xmlns:a16="http://schemas.microsoft.com/office/drawing/2014/main" xmlns="" id="{F2153DD3-C27C-457D-ADDD-066D01CB95CA}"/>
+                <a16:creationId xmlns:a16="http://schemas.microsoft.com/office/drawing/2014/main" id="{F2153DD3-C27C-457D-ADDD-066D01CB95CA}"/>
               </a:ext>
             </a:extLst>
           </p:cNvPr>
@@ -11005,7 +10869,7 @@
               <a:rPr lang="es-VE" sz="2000" dirty="0">
                 <a:latin typeface="Rockwell" panose="02060603020205020403" pitchFamily="18" charset="0"/>
               </a:rPr>
-              <a:t>2.3. El conocimiento doctrinal es parte necesaria del bagaje </a:t>
+              <a:t>2.4. El conocimiento doctrinal es parte necesaria del bagaje </a:t>
             </a:r>
             <a:r>
               <a:rPr lang="es-VE" sz="2000" i="1" dirty="0">
@@ -11033,7 +10897,7 @@
           <p:cNvPr id="4" name="Marcador de contenido 3">
             <a:extLst>
               <a:ext uri="{FF2B5EF4-FFF2-40B4-BE49-F238E27FC236}">
-                <a16:creationId xmlns:a16="http://schemas.microsoft.com/office/drawing/2014/main" xmlns="" id="{31F44B22-324B-4DE8-B32C-85312184904C}"/>
+                <a16:creationId xmlns:a16="http://schemas.microsoft.com/office/drawing/2014/main" id="{31F44B22-324B-4DE8-B32C-85312184904C}"/>
               </a:ext>
             </a:extLst>
           </p:cNvPr>
@@ -11063,7 +10927,7 @@
                 <a:gridCol w="8345244">
                   <a:extLst>
                     <a:ext uri="{9D8B030D-6E8A-4147-A177-3AD203B41FA5}">
-                      <a16:colId xmlns:a16="http://schemas.microsoft.com/office/drawing/2014/main" xmlns="" val="743422230"/>
+                      <a16:colId xmlns:a16="http://schemas.microsoft.com/office/drawing/2014/main" val="743422230"/>
                     </a:ext>
                   </a:extLst>
                 </a:gridCol>
@@ -11175,7 +11039,7 @@
                 </a:tc>
                 <a:extLst>
                   <a:ext uri="{0D108BD9-81ED-4DB2-BD59-A6C34878D82A}">
-                    <a16:rowId xmlns:a16="http://schemas.microsoft.com/office/drawing/2014/main" xmlns="" val="744739329"/>
+                    <a16:rowId xmlns:a16="http://schemas.microsoft.com/office/drawing/2014/main" val="744739329"/>
                   </a:ext>
                 </a:extLst>
               </a:tr>
@@ -11188,7 +11052,7 @@
           <p:cNvPr id="5" name="Gráfico 4" descr="Lápiz">
             <a:extLst>
               <a:ext uri="{FF2B5EF4-FFF2-40B4-BE49-F238E27FC236}">
-                <a16:creationId xmlns:a16="http://schemas.microsoft.com/office/drawing/2014/main" xmlns="" id="{0A74E1BB-B1CA-413B-8313-F68AA049A917}"/>
+                <a16:creationId xmlns:a16="http://schemas.microsoft.com/office/drawing/2014/main" id="{0A74E1BB-B1CA-413B-8313-F68AA049A917}"/>
               </a:ext>
             </a:extLst>
           </p:cNvPr>
@@ -11201,7 +11065,7 @@
           <a:blip r:embed="rId3">
             <a:extLst>
               <a:ext uri="{96DAC541-7B7A-43D3-8B79-37D633B846F1}">
-                <asvg:svgBlip xmlns:asvg="http://schemas.microsoft.com/office/drawing/2016/SVG/main" xmlns="" r:embed="rId4"/>
+                <asvg:svgBlip xmlns:asvg="http://schemas.microsoft.com/office/drawing/2016/SVG/main" r:embed="rId4"/>
               </a:ext>
             </a:extLst>
           </a:blip>
@@ -11229,13 +11093,6 @@
   <p:clrMapOvr>
     <a:masterClrMapping/>
   </p:clrMapOvr>
-  <p:timing>
-    <p:tnLst>
-      <p:par>
-        <p:cTn id="1" dur="indefinite" restart="never" nodeType="tmRoot"/>
-      </p:par>
-    </p:tnLst>
-  </p:timing>
 </p:sld>
 </file>
 
@@ -11470,7 +11327,7 @@
   <a:extraClrSchemeLst/>
   <a:extLst>
     <a:ext uri="{05A4C25C-085E-4340-85A3-A5531E510DB2}">
-      <thm15:themeFamily xmlns:thm15="http://schemas.microsoft.com/office/thememl/2012/main" xmlns="" name="Office_30450642_TF55885775" id="{A3D577B1-594C-41E0-B1C2-F30B18616F66}" vid="{8FF44D27-C355-431A-AC37-EFD8F965159C}"/>
+      <thm15:themeFamily xmlns:thm15="http://schemas.microsoft.com/office/thememl/2012/main" name="Office_30450642_TF55885775" id="{A3D577B1-594C-41E0-B1C2-F30B18616F66}" vid="{8FF44D27-C355-431A-AC37-EFD8F965159C}"/>
     </a:ext>
   </a:extLst>
 </a:theme>
@@ -11765,7 +11622,7 @@
   <a:extraClrSchemeLst/>
   <a:extLst>
     <a:ext uri="{05A4C25C-085E-4340-85A3-A5531E510DB2}">
-      <thm15:themeFamily xmlns:thm15="http://schemas.microsoft.com/office/thememl/2012/main" xmlns="" name="Office Theme" id="{62F939B6-93AF-4DB8-9C6B-D6C7DFDC589F}" vid="{4A3C46E8-61CC-4603-A589-7422A47A8E4A}"/>
+      <thm15:themeFamily xmlns:thm15="http://schemas.microsoft.com/office/thememl/2012/main" name="Office Theme" id="{62F939B6-93AF-4DB8-9C6B-D6C7DFDC589F}" vid="{4A3C46E8-61CC-4603-A589-7422A47A8E4A}"/>
     </a:ext>
   </a:extLst>
 </a:theme>
@@ -12026,7 +11883,7 @@
   <a:extraClrSchemeLst/>
   <a:extLst>
     <a:ext uri="{05A4C25C-085E-4340-85A3-A5531E510DB2}">
-      <thm15:themeFamily xmlns:thm15="http://schemas.microsoft.com/office/thememl/2012/main" xmlns="" name="Office Theme" id="{62F939B6-93AF-4DB8-9C6B-D6C7DFDC589F}" vid="{4A3C46E8-61CC-4603-A589-7422A47A8E4A}"/>
+      <thm15:themeFamily xmlns:thm15="http://schemas.microsoft.com/office/thememl/2012/main" name="Office Theme" id="{62F939B6-93AF-4DB8-9C6B-D6C7DFDC589F}" vid="{4A3C46E8-61CC-4603-A589-7422A47A8E4A}"/>
     </a:ext>
   </a:extLst>
 </a:theme>

</xml_diff>